<commit_message>
Added Week 3 Content
</commit_message>
<xml_diff>
--- a/week-2/W2-S1-BoxModel/W2-S1-BoxModel.pptx
+++ b/week-2/W2-S1-BoxModel/W2-S1-BoxModel.pptx
@@ -461,7 +461,7 @@
           <a:p>
             <a:fld id="{AA884A5F-B9F5-9B43-BE5B-EBBCD5646595}" type="datetimeFigureOut">
               <a:rPr lang="en-US" smtClean="0"/>
-              <a:t>9/21/24</a:t>
+              <a:t>9/24/24</a:t>
             </a:fld>
             <a:endParaRPr lang="en-US"/>
           </a:p>
@@ -1058,7 +1058,7 @@
           <a:p>
             <a:fld id="{F6FA2B21-3FCD-4721-B95C-427943F61125}" type="datetime1">
               <a:rPr lang="en-US" smtClean="0"/>
-              <a:t>9/21/24</a:t>
+              <a:t>9/24/24</a:t>
             </a:fld>
             <a:endParaRPr lang="en-US"/>
           </a:p>
@@ -1321,7 +1321,7 @@
           <a:p>
             <a:fld id="{F6FA2B21-3FCD-4721-B95C-427943F61125}" type="datetime1">
               <a:rPr lang="en-US" smtClean="0"/>
-              <a:t>9/21/24</a:t>
+              <a:t>9/24/24</a:t>
             </a:fld>
             <a:endParaRPr lang="en-US"/>
           </a:p>
@@ -1557,7 +1557,7 @@
           <a:p>
             <a:fld id="{F6FA2B21-3FCD-4721-B95C-427943F61125}" type="datetime1">
               <a:rPr lang="en-US" smtClean="0"/>
-              <a:t>9/21/24</a:t>
+              <a:t>9/24/24</a:t>
             </a:fld>
             <a:endParaRPr lang="en-US"/>
           </a:p>
@@ -1885,7 +1885,7 @@
           <a:p>
             <a:fld id="{EA0C0817-A112-4847-8014-A94B7D2A4EA3}" type="datetime1">
               <a:rPr lang="en-US" smtClean="0"/>
-              <a:t>9/21/24</a:t>
+              <a:t>9/24/24</a:t>
             </a:fld>
             <a:endParaRPr lang="en-US" dirty="0"/>
           </a:p>
@@ -2199,7 +2199,7 @@
           <a:p>
             <a:fld id="{7332B432-ACDA-4023-A761-2BAB76577B62}" type="datetime1">
               <a:rPr lang="en-US" smtClean="0"/>
-              <a:t>9/21/24</a:t>
+              <a:t>9/24/24</a:t>
             </a:fld>
             <a:endParaRPr lang="en-US"/>
           </a:p>
@@ -2506,7 +2506,7 @@
           <a:p>
             <a:fld id="{D9C646AA-F36E-4540-911D-FFFC0A0EF24A}" type="datetime1">
               <a:rPr lang="en-US" smtClean="0"/>
-              <a:t>9/21/24</a:t>
+              <a:t>9/24/24</a:t>
             </a:fld>
             <a:endParaRPr lang="en-US" dirty="0"/>
           </a:p>
@@ -2808,7 +2808,7 @@
           <a:p>
             <a:fld id="{69186D26-FA5F-4637-B602-B7C2DC34CFD4}" type="datetime1">
               <a:rPr lang="en-US" smtClean="0"/>
-              <a:t>9/21/24</a:t>
+              <a:t>9/24/24</a:t>
             </a:fld>
             <a:endParaRPr lang="en-US"/>
           </a:p>
@@ -3230,7 +3230,7 @@
           <a:p>
             <a:fld id="{8A7F15D8-96D1-4781-BC50-CA8A088B2FE4}" type="datetime1">
               <a:rPr lang="en-US" smtClean="0"/>
-              <a:t>9/21/24</a:t>
+              <a:t>9/24/24</a:t>
             </a:fld>
             <a:endParaRPr lang="en-US"/>
           </a:p>
@@ -3392,7 +3392,7 @@
           <a:p>
             <a:fld id="{F9A96C99-B8F8-4528-BD05-0E16E943DC09}" type="datetime1">
               <a:rPr lang="en-US" smtClean="0"/>
-              <a:t>9/21/24</a:t>
+              <a:t>9/24/24</a:t>
             </a:fld>
             <a:endParaRPr lang="en-US"/>
           </a:p>
@@ -3487,7 +3487,7 @@
           <a:p>
             <a:fld id="{03636942-C211-4B28-8DBD-C953E00AF71B}" type="datetime1">
               <a:rPr lang="en-US" smtClean="0"/>
-              <a:t>9/21/24</a:t>
+              <a:t>9/24/24</a:t>
             </a:fld>
             <a:endParaRPr lang="en-US"/>
           </a:p>
@@ -3865,7 +3865,7 @@
           <a:p>
             <a:fld id="{7E8D12A6-918A-48BD-8CB9-CA713993B0EA}" type="datetime1">
               <a:rPr lang="en-US" smtClean="0"/>
-              <a:t>9/21/24</a:t>
+              <a:t>9/24/24</a:t>
             </a:fld>
             <a:endParaRPr lang="en-US"/>
           </a:p>
@@ -4154,7 +4154,7 @@
           <a:p>
             <a:fld id="{F6FA2B21-3FCD-4721-B95C-427943F61125}" type="datetime1">
               <a:rPr lang="en-US" smtClean="0"/>
-              <a:t>9/21/24</a:t>
+              <a:t>9/24/24</a:t>
             </a:fld>
             <a:endParaRPr lang="en-US"/>
           </a:p>
@@ -4366,7 +4366,7 @@
           <a:p>
             <a:fld id="{F6FA2B21-3FCD-4721-B95C-427943F61125}" type="datetime1">
               <a:rPr lang="en-US" smtClean="0"/>
-              <a:t>9/21/24</a:t>
+              <a:t>9/24/24</a:t>
             </a:fld>
             <a:endParaRPr lang="en-US"/>
           </a:p>
@@ -8116,6 +8116,19 @@
               <a:rPr lang="en-GB" dirty="0"/>
               <a:t> A blue solid border with 3px thickness.</a:t>
             </a:r>
+            <a:br>
+              <a:rPr lang="en-GB" dirty="0"/>
+            </a:br>
+            <a:br>
+              <a:rPr lang="en-GB" dirty="0"/>
+            </a:br>
+            <a:br>
+              <a:rPr lang="en-GB" dirty="0"/>
+            </a:br>
+            <a:r>
+              <a:rPr lang="en-GB" dirty="0"/>
+              <a:t>Demo …</a:t>
+            </a:r>
           </a:p>
         </p:txBody>
       </p:sp>
@@ -8141,7 +8154,7 @@
         </p:blipFill>
         <p:spPr>
           <a:xfrm>
-            <a:off x="879697" y="2489496"/>
+            <a:off x="911595" y="2336800"/>
             <a:ext cx="3670300" cy="1092200"/>
           </a:xfrm>
           <a:prstGeom prst="rect">

</xml_diff>